<commit_message>
updated slide deck with from Fri's call
</commit_message>
<xml_diff>
--- a/documentation/SupportingDocuments/Presentations/Sponsor or App Id proposal.pptx
+++ b/documentation/SupportingDocuments/Presentations/Sponsor or App Id proposal.pptx
@@ -5,13 +5,14 @@
     <p:sldMasterId id="2147483648" r:id="rId1"/>
   </p:sldMasterIdLst>
   <p:notesMasterIdLst>
-    <p:notesMasterId r:id="rId6"/>
+    <p:notesMasterId r:id="rId7"/>
   </p:notesMasterIdLst>
   <p:sldIdLst>
     <p:sldId id="258" r:id="rId2"/>
     <p:sldId id="259" r:id="rId3"/>
     <p:sldId id="260" r:id="rId4"/>
     <p:sldId id="261" r:id="rId5"/>
+    <p:sldId id="262" r:id="rId6"/>
   </p:sldIdLst>
   <p:sldSz cx="12192000" cy="6858000"/>
   <p:notesSz cx="6858000" cy="9144000"/>
@@ -110,6 +111,11 @@
       </a:defRPr>
     </a:lvl9pPr>
   </p:defaultTextStyle>
+  <p:extLst>
+    <p:ext uri="{EFAFB233-063F-42B5-8137-9DF3F51BA10A}">
+      <p15:sldGuideLst xmlns:p15="http://schemas.microsoft.com/office/powerpoint/2012/main"/>
+    </p:ext>
+  </p:extLst>
 </p:presentation>
 </file>
 
@@ -195,7 +201,7 @@
           <a:p>
             <a:fld id="{C7A554D9-F410-2D46-9279-2B1B4D85AEAC}" type="datetimeFigureOut">
               <a:rPr lang="en-US" smtClean="0"/>
-              <a:t>8/10/23</a:t>
+              <a:t>8/13/23</a:t>
             </a:fld>
             <a:endParaRPr lang="en-US"/>
           </a:p>
@@ -705,7 +711,7 @@
           <a:p>
             <a:fld id="{85D085E9-4F6E-F44D-8C86-9952DFDF628C}" type="datetimeFigureOut">
               <a:rPr lang="en-US" smtClean="0"/>
-              <a:t>8/9/23</a:t>
+              <a:t>8/13/23</a:t>
             </a:fld>
             <a:endParaRPr lang="en-US"/>
           </a:p>
@@ -903,7 +909,7 @@
           <a:p>
             <a:fld id="{85D085E9-4F6E-F44D-8C86-9952DFDF628C}" type="datetimeFigureOut">
               <a:rPr lang="en-US" smtClean="0"/>
-              <a:t>8/9/23</a:t>
+              <a:t>8/13/23</a:t>
             </a:fld>
             <a:endParaRPr lang="en-US"/>
           </a:p>
@@ -1111,7 +1117,7 @@
           <a:p>
             <a:fld id="{85D085E9-4F6E-F44D-8C86-9952DFDF628C}" type="datetimeFigureOut">
               <a:rPr lang="en-US" smtClean="0"/>
-              <a:t>8/9/23</a:t>
+              <a:t>8/13/23</a:t>
             </a:fld>
             <a:endParaRPr lang="en-US"/>
           </a:p>
@@ -1309,7 +1315,7 @@
           <a:p>
             <a:fld id="{85D085E9-4F6E-F44D-8C86-9952DFDF628C}" type="datetimeFigureOut">
               <a:rPr lang="en-US" smtClean="0"/>
-              <a:t>8/9/23</a:t>
+              <a:t>8/13/23</a:t>
             </a:fld>
             <a:endParaRPr lang="en-US"/>
           </a:p>
@@ -1584,7 +1590,7 @@
           <a:p>
             <a:fld id="{85D085E9-4F6E-F44D-8C86-9952DFDF628C}" type="datetimeFigureOut">
               <a:rPr lang="en-US" smtClean="0"/>
-              <a:t>8/9/23</a:t>
+              <a:t>8/13/23</a:t>
             </a:fld>
             <a:endParaRPr lang="en-US"/>
           </a:p>
@@ -1849,7 +1855,7 @@
           <a:p>
             <a:fld id="{85D085E9-4F6E-F44D-8C86-9952DFDF628C}" type="datetimeFigureOut">
               <a:rPr lang="en-US" smtClean="0"/>
-              <a:t>8/9/23</a:t>
+              <a:t>8/13/23</a:t>
             </a:fld>
             <a:endParaRPr lang="en-US"/>
           </a:p>
@@ -2261,7 +2267,7 @@
           <a:p>
             <a:fld id="{85D085E9-4F6E-F44D-8C86-9952DFDF628C}" type="datetimeFigureOut">
               <a:rPr lang="en-US" smtClean="0"/>
-              <a:t>8/9/23</a:t>
+              <a:t>8/13/23</a:t>
             </a:fld>
             <a:endParaRPr lang="en-US"/>
           </a:p>
@@ -2402,7 +2408,7 @@
           <a:p>
             <a:fld id="{85D085E9-4F6E-F44D-8C86-9952DFDF628C}" type="datetimeFigureOut">
               <a:rPr lang="en-US" smtClean="0"/>
-              <a:t>8/9/23</a:t>
+              <a:t>8/13/23</a:t>
             </a:fld>
             <a:endParaRPr lang="en-US"/>
           </a:p>
@@ -2515,7 +2521,7 @@
           <a:p>
             <a:fld id="{85D085E9-4F6E-F44D-8C86-9952DFDF628C}" type="datetimeFigureOut">
               <a:rPr lang="en-US" smtClean="0"/>
-              <a:t>8/9/23</a:t>
+              <a:t>8/13/23</a:t>
             </a:fld>
             <a:endParaRPr lang="en-US"/>
           </a:p>
@@ -2826,7 +2832,7 @@
           <a:p>
             <a:fld id="{85D085E9-4F6E-F44D-8C86-9952DFDF628C}" type="datetimeFigureOut">
               <a:rPr lang="en-US" smtClean="0"/>
-              <a:t>8/9/23</a:t>
+              <a:t>8/13/23</a:t>
             </a:fld>
             <a:endParaRPr lang="en-US"/>
           </a:p>
@@ -3114,7 +3120,7 @@
           <a:p>
             <a:fld id="{85D085E9-4F6E-F44D-8C86-9952DFDF628C}" type="datetimeFigureOut">
               <a:rPr lang="en-US" smtClean="0"/>
-              <a:t>8/9/23</a:t>
+              <a:t>8/13/23</a:t>
             </a:fld>
             <a:endParaRPr lang="en-US"/>
           </a:p>
@@ -3355,7 +3361,7 @@
           <a:p>
             <a:fld id="{85D085E9-4F6E-F44D-8C86-9952DFDF628C}" type="datetimeFigureOut">
               <a:rPr lang="en-US" smtClean="0"/>
-              <a:t>8/9/23</a:t>
+              <a:t>8/13/23</a:t>
             </a:fld>
             <a:endParaRPr lang="en-US"/>
           </a:p>
@@ -3842,7 +3848,7 @@
             <a:pPr algn="ctr"/>
             <a:r>
               <a:rPr lang="en-US" sz="1400" dirty="0"/>
-              <a:t>Customer</a:t>
+              <a:t>Customer( ASP)</a:t>
             </a:r>
             <a:r>
               <a:rPr lang="en-US" dirty="0"/>
@@ -4715,11 +4721,8 @@
           <a:p>
             <a:r>
               <a:rPr lang="en-US" dirty="0"/>
-              <a:t>Problem statement : Track data usage for QOD session per customer and applications.</a:t>
-            </a:r>
-          </a:p>
-          <a:p>
-            <a:endParaRPr lang="en-US" dirty="0"/>
+              <a:t>Problem statement : Track data usage for QOD session per customer and applications for visibility and monetization purposes.</a:t>
+            </a:r>
           </a:p>
           <a:p>
             <a:endParaRPr lang="en-US" dirty="0"/>
@@ -5010,11 +5013,7 @@
             <a:pPr algn="ctr"/>
             <a:r>
               <a:rPr lang="en-US" sz="1400" dirty="0"/>
-              <a:t>Customer</a:t>
-            </a:r>
-            <a:r>
-              <a:rPr lang="en-US" dirty="0"/>
-              <a:t> </a:t>
+              <a:t>Customer ( ASP) </a:t>
             </a:r>
           </a:p>
         </p:txBody>
@@ -6249,7 +6248,7 @@
             <a:pPr algn="ctr"/>
             <a:r>
               <a:rPr lang="en-US" sz="1400" dirty="0"/>
-              <a:t>Customer</a:t>
+              <a:t>Customer (ASP)</a:t>
             </a:r>
             <a:r>
               <a:rPr lang="en-US" dirty="0"/>
@@ -7608,6 +7607,296 @@
     <p:extLst>
       <p:ext uri="{BB962C8B-B14F-4D97-AF65-F5344CB8AC3E}">
         <p14:creationId xmlns:p14="http://schemas.microsoft.com/office/powerpoint/2010/main" val="2798190492"/>
+      </p:ext>
+    </p:extLst>
+  </p:cSld>
+  <p:clrMapOvr>
+    <a:masterClrMapping/>
+  </p:clrMapOvr>
+</p:sld>
+</file>
+
+<file path=ppt/slides/slide5.xml><?xml version="1.0" encoding="utf-8"?>
+<p:sld xmlns:a="http://schemas.openxmlformats.org/drawingml/2006/main" xmlns:r="http://schemas.openxmlformats.org/officeDocument/2006/relationships" xmlns:p="http://schemas.openxmlformats.org/presentationml/2006/main">
+  <p:cSld>
+    <p:spTree>
+      <p:nvGrpSpPr>
+        <p:cNvPr id="1" name=""/>
+        <p:cNvGrpSpPr/>
+        <p:nvPr/>
+      </p:nvGrpSpPr>
+      <p:grpSpPr>
+        <a:xfrm>
+          <a:off x="0" y="0"/>
+          <a:ext cx="0" cy="0"/>
+          <a:chOff x="0" y="0"/>
+          <a:chExt cx="0" cy="0"/>
+        </a:xfrm>
+      </p:grpSpPr>
+      <p:sp>
+        <p:nvSpPr>
+          <p:cNvPr id="2" name="Title 1">
+            <a:extLst>
+              <a:ext uri="{FF2B5EF4-FFF2-40B4-BE49-F238E27FC236}">
+                <a16:creationId xmlns:a16="http://schemas.microsoft.com/office/drawing/2014/main" id="{514A5658-3189-5B4D-9B64-F6A8F3758FD6}"/>
+              </a:ext>
+            </a:extLst>
+          </p:cNvPr>
+          <p:cNvSpPr>
+            <a:spLocks noGrp="1"/>
+          </p:cNvSpPr>
+          <p:nvPr>
+            <p:ph type="title"/>
+          </p:nvPr>
+        </p:nvSpPr>
+        <p:spPr/>
+        <p:txBody>
+          <a:bodyPr/>
+          <a:lstStyle/>
+          <a:p>
+            <a:r>
+              <a:rPr lang="en-US" dirty="0"/>
+              <a:t>Ques</a:t>
+            </a:r>
+          </a:p>
+        </p:txBody>
+      </p:sp>
+      <p:sp>
+        <p:nvSpPr>
+          <p:cNvPr id="3" name="Content Placeholder 2">
+            <a:extLst>
+              <a:ext uri="{FF2B5EF4-FFF2-40B4-BE49-F238E27FC236}">
+                <a16:creationId xmlns:a16="http://schemas.microsoft.com/office/drawing/2014/main" id="{0B1A5370-C180-4A49-AC88-BD50BDA2973C}"/>
+              </a:ext>
+            </a:extLst>
+          </p:cNvPr>
+          <p:cNvSpPr>
+            <a:spLocks noGrp="1"/>
+          </p:cNvSpPr>
+          <p:nvPr>
+            <p:ph idx="1"/>
+          </p:nvPr>
+        </p:nvSpPr>
+        <p:spPr/>
+        <p:txBody>
+          <a:bodyPr>
+            <a:normAutofit/>
+          </a:bodyPr>
+          <a:lstStyle/>
+          <a:p>
+            <a:pPr marL="342900" indent="-342900">
+              <a:buFont typeface="+mj-lt"/>
+              <a:buAutoNum type="arabicPeriod" startAt="3"/>
+            </a:pPr>
+            <a:r>
+              <a:rPr lang="en-US" sz="1600" dirty="0">
+                <a:solidFill>
+                  <a:schemeClr val="accent1"/>
+                </a:solidFill>
+              </a:rPr>
+              <a:t> Another workaround could be generating individual token for application</a:t>
+            </a:r>
+          </a:p>
+          <a:p>
+            <a:pPr marL="0" indent="0">
+              <a:buNone/>
+            </a:pPr>
+            <a:r>
+              <a:rPr lang="en-US" sz="1600" dirty="0"/>
+              <a:t>This would be a logistical nightmare and huge burden for ASP to track each Individual application tokens. </a:t>
+            </a:r>
+          </a:p>
+          <a:p>
+            <a:pPr marL="0" indent="0">
+              <a:buNone/>
+            </a:pPr>
+            <a:endParaRPr lang="en-US" sz="1600" dirty="0"/>
+          </a:p>
+          <a:p>
+            <a:pPr marL="0" indent="0">
+              <a:buNone/>
+            </a:pPr>
+            <a:r>
+              <a:rPr lang="en-US" sz="1600" dirty="0">
+                <a:solidFill>
+                  <a:schemeClr val="accent1"/>
+                </a:solidFill>
+              </a:rPr>
+              <a:t>4. How would we ensure that customer (ASP) doesn't pass any random </a:t>
+            </a:r>
+            <a:r>
+              <a:rPr lang="en-US" sz="1600" dirty="0" err="1">
+                <a:solidFill>
+                  <a:schemeClr val="accent1"/>
+                </a:solidFill>
+              </a:rPr>
+              <a:t>appId</a:t>
+            </a:r>
+            <a:r>
+              <a:rPr lang="en-US" sz="1600" dirty="0">
+                <a:solidFill>
+                  <a:schemeClr val="accent1"/>
+                </a:solidFill>
+              </a:rPr>
+              <a:t> in the payload</a:t>
+            </a:r>
+          </a:p>
+          <a:p>
+            <a:pPr marL="0" indent="0">
+              <a:buNone/>
+            </a:pPr>
+            <a:r>
+              <a:rPr lang="en-US" sz="1600" dirty="0"/>
+              <a:t>During the onboarding flow. Customer will register its applications and service provider portal will generate </a:t>
+            </a:r>
+            <a:r>
+              <a:rPr lang="en-US" sz="1600" dirty="0" err="1"/>
+              <a:t>appID</a:t>
+            </a:r>
+            <a:r>
+              <a:rPr lang="en-US" sz="1600" dirty="0"/>
+              <a:t> that would be unique and traced back to the customer. Customer will use the </a:t>
+            </a:r>
+            <a:r>
+              <a:rPr lang="en-US" sz="1600" dirty="0" err="1"/>
+              <a:t>appId</a:t>
+            </a:r>
+            <a:r>
+              <a:rPr lang="en-US" sz="1600" dirty="0"/>
+              <a:t> ( provided by the service provider) in </a:t>
+            </a:r>
+            <a:r>
+              <a:rPr lang="en-US" sz="1600" dirty="0" err="1"/>
+              <a:t>QoD</a:t>
+            </a:r>
+            <a:r>
+              <a:rPr lang="en-US" sz="1600" dirty="0"/>
+              <a:t> </a:t>
+            </a:r>
+            <a:r>
+              <a:rPr lang="en-US" sz="1600" dirty="0" err="1"/>
+              <a:t>api</a:t>
+            </a:r>
+            <a:r>
+              <a:rPr lang="en-US" sz="1600" dirty="0"/>
+              <a:t> payload.</a:t>
+            </a:r>
+          </a:p>
+          <a:p>
+            <a:pPr marL="0" indent="0">
+              <a:buNone/>
+            </a:pPr>
+            <a:endParaRPr lang="en-US" sz="1600" dirty="0"/>
+          </a:p>
+          <a:p>
+            <a:pPr marL="0" indent="0">
+              <a:buNone/>
+            </a:pPr>
+            <a:r>
+              <a:rPr lang="en-US" sz="1600" dirty="0">
+                <a:solidFill>
+                  <a:schemeClr val="accent1"/>
+                </a:solidFill>
+              </a:rPr>
+              <a:t>5. SCEF/ NEF has </a:t>
+            </a:r>
+            <a:r>
+              <a:rPr lang="en-US" sz="1600" dirty="0" err="1">
+                <a:solidFill>
+                  <a:schemeClr val="accent1"/>
+                </a:solidFill>
+              </a:rPr>
+              <a:t>scsAsId</a:t>
+            </a:r>
+            <a:r>
+              <a:rPr lang="en-US" sz="1600" dirty="0">
+                <a:solidFill>
+                  <a:schemeClr val="accent1"/>
+                </a:solidFill>
+              </a:rPr>
+              <a:t>, sponsor Id and </a:t>
+            </a:r>
+            <a:r>
+              <a:rPr lang="en-US" sz="1600" dirty="0" err="1">
+                <a:solidFill>
+                  <a:schemeClr val="accent1"/>
+                </a:solidFill>
+              </a:rPr>
+              <a:t>aspId</a:t>
+            </a:r>
+            <a:r>
+              <a:rPr lang="en-US" sz="1600" dirty="0">
+                <a:solidFill>
+                  <a:schemeClr val="accent1"/>
+                </a:solidFill>
+              </a:rPr>
+              <a:t> in T8 API spec. Which Id would it map to?</a:t>
+            </a:r>
+          </a:p>
+          <a:p>
+            <a:pPr marL="0" indent="0">
+              <a:buNone/>
+            </a:pPr>
+            <a:r>
+              <a:rPr lang="en-US" sz="1600" dirty="0" err="1"/>
+              <a:t>scsAsId</a:t>
+            </a:r>
+            <a:r>
+              <a:rPr lang="en-US" sz="1600" dirty="0"/>
+              <a:t> is an application that is interfacing directly with NEF. Generally, </a:t>
+            </a:r>
+            <a:r>
+              <a:rPr lang="en-US" sz="1600" dirty="0" err="1"/>
+              <a:t>scsAsId</a:t>
+            </a:r>
+            <a:r>
+              <a:rPr lang="en-US" sz="1600" dirty="0"/>
+              <a:t> would be a CAMARA </a:t>
+            </a:r>
+            <a:r>
+              <a:rPr lang="en-US" sz="1600" dirty="0" err="1"/>
+              <a:t>QoD</a:t>
+            </a:r>
+            <a:r>
+              <a:rPr lang="en-US" sz="1600" dirty="0"/>
+              <a:t> service.  The relevant NEF identifiers would be </a:t>
+            </a:r>
+            <a:r>
+              <a:rPr lang="en-US" sz="1600" dirty="0" err="1"/>
+              <a:t>sponsorId</a:t>
+            </a:r>
+            <a:r>
+              <a:rPr lang="en-US" sz="1600" dirty="0"/>
+              <a:t> and or </a:t>
+            </a:r>
+            <a:r>
+              <a:rPr lang="en-US" sz="1600" dirty="0" err="1"/>
+              <a:t>aspId</a:t>
+            </a:r>
+            <a:r>
+              <a:rPr lang="en-US" sz="1600" dirty="0"/>
+              <a:t> for this use case. So </a:t>
+            </a:r>
+            <a:r>
+              <a:rPr lang="en-US" sz="1600" dirty="0" err="1"/>
+              <a:t>appId</a:t>
+            </a:r>
+            <a:r>
+              <a:rPr lang="en-US" sz="1600" dirty="0"/>
+              <a:t> ( we can decide on the appropriate name) would map to sponsor id or asp Id in NEF T8 API.</a:t>
+            </a:r>
+            <a:endParaRPr lang="en-US" sz="1600" dirty="0">
+              <a:solidFill>
+                <a:schemeClr val="accent1"/>
+              </a:solidFill>
+            </a:endParaRPr>
+          </a:p>
+        </p:txBody>
+      </p:sp>
+    </p:spTree>
+    <p:extLst>
+      <p:ext uri="{BB962C8B-B14F-4D97-AF65-F5344CB8AC3E}">
+        <p14:creationId xmlns:p14="http://schemas.microsoft.com/office/powerpoint/2010/main" val="3687893703"/>
       </p:ext>
     </p:extLst>
   </p:cSld>

</xml_diff>